<commit_message>
Do we really need multi-threading?
</commit_message>
<xml_diff>
--- a/WebsiteCrawler/docs/WebSiteCrawler.pptx
+++ b/WebsiteCrawler/docs/WebSiteCrawler.pptx
@@ -7,6 +7,7 @@
   <p:sldIdLst>
     <p:sldId id="256" r:id="rId2"/>
     <p:sldId id="257" r:id="rId3"/>
+    <p:sldId id="258" r:id="rId4"/>
   </p:sldIdLst>
   <p:sldSz cx="12192000" cy="6858000"/>
   <p:notesSz cx="6858000" cy="9144000"/>
@@ -105,6 +106,11 @@
       </a:defRPr>
     </a:lvl9pPr>
   </p:defaultTextStyle>
+  <p:extLst>
+    <p:ext uri="{EFAFB233-063F-42B5-8137-9DF3F51BA10A}">
+      <p15:sldGuideLst xmlns:p15="http://schemas.microsoft.com/office/powerpoint/2012/main"/>
+    </p:ext>
+  </p:extLst>
 </p:presentation>
 </file>
 
@@ -257,7 +263,7 @@
           <a:p>
             <a:fld id="{51DD0C78-F4C8-4703-B538-CF61246F8B52}" type="datetimeFigureOut">
               <a:rPr lang="en-GB" smtClean="0"/>
-              <a:t>19/03/2022</a:t>
+              <a:t>21/03/2022</a:t>
             </a:fld>
             <a:endParaRPr lang="en-GB"/>
           </a:p>
@@ -457,7 +463,7 @@
           <a:p>
             <a:fld id="{51DD0C78-F4C8-4703-B538-CF61246F8B52}" type="datetimeFigureOut">
               <a:rPr lang="en-GB" smtClean="0"/>
-              <a:t>19/03/2022</a:t>
+              <a:t>21/03/2022</a:t>
             </a:fld>
             <a:endParaRPr lang="en-GB"/>
           </a:p>
@@ -667,7 +673,7 @@
           <a:p>
             <a:fld id="{51DD0C78-F4C8-4703-B538-CF61246F8B52}" type="datetimeFigureOut">
               <a:rPr lang="en-GB" smtClean="0"/>
-              <a:t>19/03/2022</a:t>
+              <a:t>21/03/2022</a:t>
             </a:fld>
             <a:endParaRPr lang="en-GB"/>
           </a:p>
@@ -867,7 +873,7 @@
           <a:p>
             <a:fld id="{51DD0C78-F4C8-4703-B538-CF61246F8B52}" type="datetimeFigureOut">
               <a:rPr lang="en-GB" smtClean="0"/>
-              <a:t>19/03/2022</a:t>
+              <a:t>21/03/2022</a:t>
             </a:fld>
             <a:endParaRPr lang="en-GB"/>
           </a:p>
@@ -1143,7 +1149,7 @@
           <a:p>
             <a:fld id="{51DD0C78-F4C8-4703-B538-CF61246F8B52}" type="datetimeFigureOut">
               <a:rPr lang="en-GB" smtClean="0"/>
-              <a:t>19/03/2022</a:t>
+              <a:t>21/03/2022</a:t>
             </a:fld>
             <a:endParaRPr lang="en-GB"/>
           </a:p>
@@ -1411,7 +1417,7 @@
           <a:p>
             <a:fld id="{51DD0C78-F4C8-4703-B538-CF61246F8B52}" type="datetimeFigureOut">
               <a:rPr lang="en-GB" smtClean="0"/>
-              <a:t>19/03/2022</a:t>
+              <a:t>21/03/2022</a:t>
             </a:fld>
             <a:endParaRPr lang="en-GB"/>
           </a:p>
@@ -1826,7 +1832,7 @@
           <a:p>
             <a:fld id="{51DD0C78-F4C8-4703-B538-CF61246F8B52}" type="datetimeFigureOut">
               <a:rPr lang="en-GB" smtClean="0"/>
-              <a:t>19/03/2022</a:t>
+              <a:t>21/03/2022</a:t>
             </a:fld>
             <a:endParaRPr lang="en-GB"/>
           </a:p>
@@ -1968,7 +1974,7 @@
           <a:p>
             <a:fld id="{51DD0C78-F4C8-4703-B538-CF61246F8B52}" type="datetimeFigureOut">
               <a:rPr lang="en-GB" smtClean="0"/>
-              <a:t>19/03/2022</a:t>
+              <a:t>21/03/2022</a:t>
             </a:fld>
             <a:endParaRPr lang="en-GB"/>
           </a:p>
@@ -2081,7 +2087,7 @@
           <a:p>
             <a:fld id="{51DD0C78-F4C8-4703-B538-CF61246F8B52}" type="datetimeFigureOut">
               <a:rPr lang="en-GB" smtClean="0"/>
-              <a:t>19/03/2022</a:t>
+              <a:t>21/03/2022</a:t>
             </a:fld>
             <a:endParaRPr lang="en-GB"/>
           </a:p>
@@ -2394,7 +2400,7 @@
           <a:p>
             <a:fld id="{51DD0C78-F4C8-4703-B538-CF61246F8B52}" type="datetimeFigureOut">
               <a:rPr lang="en-GB" smtClean="0"/>
-              <a:t>19/03/2022</a:t>
+              <a:t>21/03/2022</a:t>
             </a:fld>
             <a:endParaRPr lang="en-GB"/>
           </a:p>
@@ -2683,7 +2689,7 @@
           <a:p>
             <a:fld id="{51DD0C78-F4C8-4703-B538-CF61246F8B52}" type="datetimeFigureOut">
               <a:rPr lang="en-GB" smtClean="0"/>
-              <a:t>19/03/2022</a:t>
+              <a:t>21/03/2022</a:t>
             </a:fld>
             <a:endParaRPr lang="en-GB"/>
           </a:p>
@@ -2926,7 +2932,7 @@
           <a:p>
             <a:fld id="{51DD0C78-F4C8-4703-B538-CF61246F8B52}" type="datetimeFigureOut">
               <a:rPr lang="en-GB" smtClean="0"/>
-              <a:t>19/03/2022</a:t>
+              <a:t>21/03/2022</a:t>
             </a:fld>
             <a:endParaRPr lang="en-GB"/>
           </a:p>
@@ -3910,6 +3916,738 @@
 </p:sld>
 </file>
 
+<file path=ppt/slides/slide3.xml><?xml version="1.0" encoding="utf-8"?>
+<p:sld xmlns:a="http://schemas.openxmlformats.org/drawingml/2006/main" xmlns:r="http://schemas.openxmlformats.org/officeDocument/2006/relationships" xmlns:p="http://schemas.openxmlformats.org/presentationml/2006/main">
+  <p:cSld>
+    <p:spTree>
+      <p:nvGrpSpPr>
+        <p:cNvPr id="1" name=""/>
+        <p:cNvGrpSpPr/>
+        <p:nvPr/>
+      </p:nvGrpSpPr>
+      <p:grpSpPr>
+        <a:xfrm>
+          <a:off x="0" y="0"/>
+          <a:ext cx="0" cy="0"/>
+          <a:chOff x="0" y="0"/>
+          <a:chExt cx="0" cy="0"/>
+        </a:xfrm>
+      </p:grpSpPr>
+      <p:sp>
+        <p:nvSpPr>
+          <p:cNvPr id="3" name="TextBox 2">
+            <a:extLst>
+              <a:ext uri="{FF2B5EF4-FFF2-40B4-BE49-F238E27FC236}">
+                <a16:creationId xmlns:a16="http://schemas.microsoft.com/office/drawing/2014/main" id="{BF4AEA07-E893-404D-B6BC-09E05A6D3356}"/>
+              </a:ext>
+            </a:extLst>
+          </p:cNvPr>
+          <p:cNvSpPr txBox="1"/>
+          <p:nvPr/>
+        </p:nvSpPr>
+        <p:spPr>
+          <a:xfrm rot="16200000">
+            <a:off x="1911492" y="3511775"/>
+            <a:ext cx="1935675" cy="369332"/>
+          </a:xfrm>
+          <a:prstGeom prst="rect">
+            <a:avLst/>
+          </a:prstGeom>
+          <a:solidFill>
+            <a:srgbClr val="FFFF00"/>
+          </a:solidFill>
+          <a:ln>
+            <a:solidFill>
+              <a:schemeClr val="accent1"/>
+            </a:solidFill>
+          </a:ln>
+        </p:spPr>
+        <p:txBody>
+          <a:bodyPr wrap="square" rtlCol="0">
+            <a:spAutoFit/>
+          </a:bodyPr>
+          <a:lstStyle/>
+          <a:p>
+            <a:r>
+              <a:rPr lang="en-GB" dirty="0"/>
+              <a:t>www.site1.com</a:t>
+            </a:r>
+          </a:p>
+        </p:txBody>
+      </p:sp>
+      <p:sp>
+        <p:nvSpPr>
+          <p:cNvPr id="4" name="TextBox 3">
+            <a:extLst>
+              <a:ext uri="{FF2B5EF4-FFF2-40B4-BE49-F238E27FC236}">
+                <a16:creationId xmlns:a16="http://schemas.microsoft.com/office/drawing/2014/main" id="{CD8AC833-3C28-4DBF-91A3-3788649E4077}"/>
+              </a:ext>
+            </a:extLst>
+          </p:cNvPr>
+          <p:cNvSpPr txBox="1"/>
+          <p:nvPr/>
+        </p:nvSpPr>
+        <p:spPr>
+          <a:xfrm rot="16200000">
+            <a:off x="4959861" y="3504477"/>
+            <a:ext cx="1921079" cy="369332"/>
+          </a:xfrm>
+          <a:prstGeom prst="rect">
+            <a:avLst/>
+          </a:prstGeom>
+          <a:solidFill>
+            <a:srgbClr val="FFFF00"/>
+          </a:solidFill>
+          <a:ln>
+            <a:solidFill>
+              <a:schemeClr val="accent1"/>
+            </a:solidFill>
+          </a:ln>
+        </p:spPr>
+        <p:txBody>
+          <a:bodyPr wrap="square" rtlCol="0">
+            <a:spAutoFit/>
+          </a:bodyPr>
+          <a:lstStyle/>
+          <a:p>
+            <a:r>
+              <a:rPr lang="en-GB" dirty="0"/>
+              <a:t>www.site2.com</a:t>
+            </a:r>
+          </a:p>
+        </p:txBody>
+      </p:sp>
+      <p:sp>
+        <p:nvSpPr>
+          <p:cNvPr id="5" name="TextBox 4">
+            <a:extLst>
+              <a:ext uri="{FF2B5EF4-FFF2-40B4-BE49-F238E27FC236}">
+                <a16:creationId xmlns:a16="http://schemas.microsoft.com/office/drawing/2014/main" id="{D5B6C2CC-F59D-4BF9-8F30-09E0309A86C0}"/>
+              </a:ext>
+            </a:extLst>
+          </p:cNvPr>
+          <p:cNvSpPr txBox="1"/>
+          <p:nvPr/>
+        </p:nvSpPr>
+        <p:spPr>
+          <a:xfrm rot="16200000">
+            <a:off x="8000935" y="3504479"/>
+            <a:ext cx="1921079" cy="369332"/>
+          </a:xfrm>
+          <a:prstGeom prst="rect">
+            <a:avLst/>
+          </a:prstGeom>
+          <a:solidFill>
+            <a:srgbClr val="FFFF00"/>
+          </a:solidFill>
+          <a:ln>
+            <a:solidFill>
+              <a:schemeClr val="accent1"/>
+            </a:solidFill>
+          </a:ln>
+        </p:spPr>
+        <p:txBody>
+          <a:bodyPr wrap="square" rtlCol="0">
+            <a:spAutoFit/>
+          </a:bodyPr>
+          <a:lstStyle/>
+          <a:p>
+            <a:r>
+              <a:rPr lang="en-GB" dirty="0"/>
+              <a:t>www</a:t>
+            </a:r>
+            <a:r>
+              <a:rPr lang="en-GB"/>
+              <a:t>.site3.</a:t>
+            </a:r>
+            <a:r>
+              <a:rPr lang="en-GB" dirty="0"/>
+              <a:t>com</a:t>
+            </a:r>
+          </a:p>
+        </p:txBody>
+      </p:sp>
+      <p:sp>
+        <p:nvSpPr>
+          <p:cNvPr id="6" name="Arrow: Down 5">
+            <a:extLst>
+              <a:ext uri="{FF2B5EF4-FFF2-40B4-BE49-F238E27FC236}">
+                <a16:creationId xmlns:a16="http://schemas.microsoft.com/office/drawing/2014/main" id="{CC592B4B-7C21-472D-B317-C4EA6DCC7647}"/>
+              </a:ext>
+            </a:extLst>
+          </p:cNvPr>
+          <p:cNvSpPr/>
+          <p:nvPr/>
+        </p:nvSpPr>
+        <p:spPr>
+          <a:xfrm>
+            <a:off x="2694662" y="923636"/>
+            <a:ext cx="369333" cy="1357746"/>
+          </a:xfrm>
+          <a:prstGeom prst="downArrow">
+            <a:avLst/>
+          </a:prstGeom>
+        </p:spPr>
+        <p:style>
+          <a:lnRef idx="2">
+            <a:schemeClr val="accent1">
+              <a:shade val="50000"/>
+            </a:schemeClr>
+          </a:lnRef>
+          <a:fillRef idx="1">
+            <a:schemeClr val="accent1"/>
+          </a:fillRef>
+          <a:effectRef idx="0">
+            <a:schemeClr val="accent1"/>
+          </a:effectRef>
+          <a:fontRef idx="minor">
+            <a:schemeClr val="lt1"/>
+          </a:fontRef>
+        </p:style>
+        <p:txBody>
+          <a:bodyPr rtlCol="0" anchor="ctr"/>
+          <a:lstStyle/>
+          <a:p>
+            <a:pPr algn="ctr"/>
+            <a:endParaRPr lang="en-GB" dirty="0"/>
+          </a:p>
+        </p:txBody>
+      </p:sp>
+      <p:sp>
+        <p:nvSpPr>
+          <p:cNvPr id="7" name="Arrow: Down 6">
+            <a:extLst>
+              <a:ext uri="{FF2B5EF4-FFF2-40B4-BE49-F238E27FC236}">
+                <a16:creationId xmlns:a16="http://schemas.microsoft.com/office/drawing/2014/main" id="{28059C92-EBE0-437A-9D5A-D3F5632D4CAC}"/>
+              </a:ext>
+            </a:extLst>
+          </p:cNvPr>
+          <p:cNvSpPr/>
+          <p:nvPr/>
+        </p:nvSpPr>
+        <p:spPr>
+          <a:xfrm>
+            <a:off x="5735734" y="923636"/>
+            <a:ext cx="369333" cy="1357746"/>
+          </a:xfrm>
+          <a:prstGeom prst="downArrow">
+            <a:avLst/>
+          </a:prstGeom>
+        </p:spPr>
+        <p:style>
+          <a:lnRef idx="2">
+            <a:schemeClr val="accent1">
+              <a:shade val="50000"/>
+            </a:schemeClr>
+          </a:lnRef>
+          <a:fillRef idx="1">
+            <a:schemeClr val="accent1"/>
+          </a:fillRef>
+          <a:effectRef idx="0">
+            <a:schemeClr val="accent1"/>
+          </a:effectRef>
+          <a:fontRef idx="minor">
+            <a:schemeClr val="lt1"/>
+          </a:fontRef>
+        </p:style>
+        <p:txBody>
+          <a:bodyPr rtlCol="0" anchor="ctr"/>
+          <a:lstStyle/>
+          <a:p>
+            <a:pPr algn="ctr"/>
+            <a:endParaRPr lang="en-GB" dirty="0"/>
+          </a:p>
+        </p:txBody>
+      </p:sp>
+      <p:sp>
+        <p:nvSpPr>
+          <p:cNvPr id="8" name="Arrow: Down 7">
+            <a:extLst>
+              <a:ext uri="{FF2B5EF4-FFF2-40B4-BE49-F238E27FC236}">
+                <a16:creationId xmlns:a16="http://schemas.microsoft.com/office/drawing/2014/main" id="{D9BB8F71-B35B-422B-AC75-71A737606012}"/>
+              </a:ext>
+            </a:extLst>
+          </p:cNvPr>
+          <p:cNvSpPr/>
+          <p:nvPr/>
+        </p:nvSpPr>
+        <p:spPr>
+          <a:xfrm>
+            <a:off x="8811614" y="923636"/>
+            <a:ext cx="369333" cy="1357746"/>
+          </a:xfrm>
+          <a:prstGeom prst="downArrow">
+            <a:avLst/>
+          </a:prstGeom>
+        </p:spPr>
+        <p:style>
+          <a:lnRef idx="2">
+            <a:schemeClr val="accent1">
+              <a:shade val="50000"/>
+            </a:schemeClr>
+          </a:lnRef>
+          <a:fillRef idx="1">
+            <a:schemeClr val="accent1"/>
+          </a:fillRef>
+          <a:effectRef idx="0">
+            <a:schemeClr val="accent1"/>
+          </a:effectRef>
+          <a:fontRef idx="minor">
+            <a:schemeClr val="lt1"/>
+          </a:fontRef>
+        </p:style>
+        <p:txBody>
+          <a:bodyPr rtlCol="0" anchor="ctr"/>
+          <a:lstStyle/>
+          <a:p>
+            <a:pPr algn="ctr"/>
+            <a:endParaRPr lang="en-GB" dirty="0"/>
+          </a:p>
+        </p:txBody>
+      </p:sp>
+      <p:sp>
+        <p:nvSpPr>
+          <p:cNvPr id="9" name="TextBox 8">
+            <a:extLst>
+              <a:ext uri="{FF2B5EF4-FFF2-40B4-BE49-F238E27FC236}">
+                <a16:creationId xmlns:a16="http://schemas.microsoft.com/office/drawing/2014/main" id="{90DD369A-4B47-46DB-A0E7-093FF2C5AD1F}"/>
+              </a:ext>
+            </a:extLst>
+          </p:cNvPr>
+          <p:cNvSpPr txBox="1"/>
+          <p:nvPr/>
+        </p:nvSpPr>
+        <p:spPr>
+          <a:xfrm>
+            <a:off x="2290618" y="2382982"/>
+            <a:ext cx="1117600" cy="369332"/>
+          </a:xfrm>
+          <a:prstGeom prst="rect">
+            <a:avLst/>
+          </a:prstGeom>
+          <a:noFill/>
+        </p:spPr>
+        <p:txBody>
+          <a:bodyPr wrap="square" rtlCol="0">
+            <a:spAutoFit/>
+          </a:bodyPr>
+          <a:lstStyle/>
+          <a:p>
+            <a:r>
+              <a:rPr lang="en-GB" dirty="0"/>
+              <a:t>Thread 1</a:t>
+            </a:r>
+          </a:p>
+        </p:txBody>
+      </p:sp>
+      <p:sp>
+        <p:nvSpPr>
+          <p:cNvPr id="10" name="TextBox 9">
+            <a:extLst>
+              <a:ext uri="{FF2B5EF4-FFF2-40B4-BE49-F238E27FC236}">
+                <a16:creationId xmlns:a16="http://schemas.microsoft.com/office/drawing/2014/main" id="{E14BC3CA-2BE1-4970-AA86-E2D3CDE30715}"/>
+              </a:ext>
+            </a:extLst>
+          </p:cNvPr>
+          <p:cNvSpPr txBox="1"/>
+          <p:nvPr/>
+        </p:nvSpPr>
+        <p:spPr>
+          <a:xfrm>
+            <a:off x="5361600" y="2359891"/>
+            <a:ext cx="1117600" cy="369332"/>
+          </a:xfrm>
+          <a:prstGeom prst="rect">
+            <a:avLst/>
+          </a:prstGeom>
+          <a:noFill/>
+        </p:spPr>
+        <p:txBody>
+          <a:bodyPr wrap="square" rtlCol="0">
+            <a:spAutoFit/>
+          </a:bodyPr>
+          <a:lstStyle/>
+          <a:p>
+            <a:r>
+              <a:rPr lang="en-GB" dirty="0"/>
+              <a:t>Thread 2</a:t>
+            </a:r>
+          </a:p>
+        </p:txBody>
+      </p:sp>
+      <p:sp>
+        <p:nvSpPr>
+          <p:cNvPr id="11" name="TextBox 10">
+            <a:extLst>
+              <a:ext uri="{FF2B5EF4-FFF2-40B4-BE49-F238E27FC236}">
+                <a16:creationId xmlns:a16="http://schemas.microsoft.com/office/drawing/2014/main" id="{24808F3E-121F-4536-9DEC-9F3DE74AA496}"/>
+              </a:ext>
+            </a:extLst>
+          </p:cNvPr>
+          <p:cNvSpPr txBox="1"/>
+          <p:nvPr/>
+        </p:nvSpPr>
+        <p:spPr>
+          <a:xfrm>
+            <a:off x="8402674" y="2351912"/>
+            <a:ext cx="1117600" cy="369332"/>
+          </a:xfrm>
+          <a:prstGeom prst="rect">
+            <a:avLst/>
+          </a:prstGeom>
+          <a:noFill/>
+        </p:spPr>
+        <p:txBody>
+          <a:bodyPr wrap="square" rtlCol="0">
+            <a:spAutoFit/>
+          </a:bodyPr>
+          <a:lstStyle/>
+          <a:p>
+            <a:r>
+              <a:rPr lang="en-GB" dirty="0"/>
+              <a:t>Thread 3</a:t>
+            </a:r>
+          </a:p>
+        </p:txBody>
+      </p:sp>
+      <p:sp>
+        <p:nvSpPr>
+          <p:cNvPr id="12" name="TextBox 11">
+            <a:extLst>
+              <a:ext uri="{FF2B5EF4-FFF2-40B4-BE49-F238E27FC236}">
+                <a16:creationId xmlns:a16="http://schemas.microsoft.com/office/drawing/2014/main" id="{9724C0CE-7B3A-442D-89FA-2E239392E5D1}"/>
+              </a:ext>
+            </a:extLst>
+          </p:cNvPr>
+          <p:cNvSpPr txBox="1"/>
+          <p:nvPr/>
+        </p:nvSpPr>
+        <p:spPr>
+          <a:xfrm>
+            <a:off x="1791855" y="300947"/>
+            <a:ext cx="8645236" cy="461665"/>
+          </a:xfrm>
+          <a:prstGeom prst="rect">
+            <a:avLst/>
+          </a:prstGeom>
+          <a:noFill/>
+        </p:spPr>
+        <p:txBody>
+          <a:bodyPr wrap="square" rtlCol="0">
+            <a:spAutoFit/>
+          </a:bodyPr>
+          <a:lstStyle/>
+          <a:p>
+            <a:r>
+              <a:rPr lang="en-GB" sz="2400" dirty="0"/>
+              <a:t>Controller thread that distributes </a:t>
+            </a:r>
+            <a:r>
+              <a:rPr lang="en-GB" sz="2400" b="1" dirty="0"/>
+              <a:t>top level sites </a:t>
+            </a:r>
+            <a:r>
+              <a:rPr lang="en-GB" sz="2400" dirty="0"/>
+              <a:t>to child threads</a:t>
+            </a:r>
+          </a:p>
+        </p:txBody>
+      </p:sp>
+      <p:sp>
+        <p:nvSpPr>
+          <p:cNvPr id="13" name="Arrow: Down 12">
+            <a:extLst>
+              <a:ext uri="{FF2B5EF4-FFF2-40B4-BE49-F238E27FC236}">
+                <a16:creationId xmlns:a16="http://schemas.microsoft.com/office/drawing/2014/main" id="{E2450763-3367-4371-AC0E-32734BD87816}"/>
+              </a:ext>
+            </a:extLst>
+          </p:cNvPr>
+          <p:cNvSpPr/>
+          <p:nvPr/>
+        </p:nvSpPr>
+        <p:spPr>
+          <a:xfrm>
+            <a:off x="2694662" y="4867860"/>
+            <a:ext cx="369333" cy="369332"/>
+          </a:xfrm>
+          <a:prstGeom prst="downArrow">
+            <a:avLst/>
+          </a:prstGeom>
+        </p:spPr>
+        <p:style>
+          <a:lnRef idx="2">
+            <a:schemeClr val="accent1">
+              <a:shade val="50000"/>
+            </a:schemeClr>
+          </a:lnRef>
+          <a:fillRef idx="1">
+            <a:schemeClr val="accent1"/>
+          </a:fillRef>
+          <a:effectRef idx="0">
+            <a:schemeClr val="accent1"/>
+          </a:effectRef>
+          <a:fontRef idx="minor">
+            <a:schemeClr val="lt1"/>
+          </a:fontRef>
+        </p:style>
+        <p:txBody>
+          <a:bodyPr rtlCol="0" anchor="ctr"/>
+          <a:lstStyle/>
+          <a:p>
+            <a:pPr algn="ctr"/>
+            <a:endParaRPr lang="en-GB" dirty="0"/>
+          </a:p>
+        </p:txBody>
+      </p:sp>
+      <p:sp>
+        <p:nvSpPr>
+          <p:cNvPr id="14" name="TextBox 13">
+            <a:extLst>
+              <a:ext uri="{FF2B5EF4-FFF2-40B4-BE49-F238E27FC236}">
+                <a16:creationId xmlns:a16="http://schemas.microsoft.com/office/drawing/2014/main" id="{DCE1E38E-1331-49CE-9661-30AD4BF099AA}"/>
+              </a:ext>
+            </a:extLst>
+          </p:cNvPr>
+          <p:cNvSpPr txBox="1"/>
+          <p:nvPr/>
+        </p:nvSpPr>
+        <p:spPr>
+          <a:xfrm>
+            <a:off x="1951412" y="5440773"/>
+            <a:ext cx="1855831" cy="646331"/>
+          </a:xfrm>
+          <a:prstGeom prst="rect">
+            <a:avLst/>
+          </a:prstGeom>
+          <a:noFill/>
+          <a:ln>
+            <a:solidFill>
+              <a:schemeClr val="accent1"/>
+            </a:solidFill>
+          </a:ln>
+        </p:spPr>
+        <p:txBody>
+          <a:bodyPr wrap="square" rtlCol="0">
+            <a:spAutoFit/>
+          </a:bodyPr>
+          <a:lstStyle/>
+          <a:p>
+            <a:pPr algn="ctr"/>
+            <a:r>
+              <a:rPr lang="en-GB" dirty="0"/>
+              <a:t>Single threaded </a:t>
+            </a:r>
+          </a:p>
+          <a:p>
+            <a:pPr algn="ctr"/>
+            <a:r>
+              <a:rPr lang="en-GB" dirty="0"/>
+              <a:t>component</a:t>
+            </a:r>
+          </a:p>
+        </p:txBody>
+      </p:sp>
+      <p:sp>
+        <p:nvSpPr>
+          <p:cNvPr id="17" name="TextBox 16">
+            <a:extLst>
+              <a:ext uri="{FF2B5EF4-FFF2-40B4-BE49-F238E27FC236}">
+                <a16:creationId xmlns:a16="http://schemas.microsoft.com/office/drawing/2014/main" id="{B3AA0C87-9DEA-4472-8B82-D2D4E2D7C0DC}"/>
+              </a:ext>
+            </a:extLst>
+          </p:cNvPr>
+          <p:cNvSpPr txBox="1"/>
+          <p:nvPr/>
+        </p:nvSpPr>
+        <p:spPr>
+          <a:xfrm>
+            <a:off x="4902430" y="5440772"/>
+            <a:ext cx="1855831" cy="646331"/>
+          </a:xfrm>
+          <a:prstGeom prst="rect">
+            <a:avLst/>
+          </a:prstGeom>
+          <a:noFill/>
+          <a:ln>
+            <a:solidFill>
+              <a:schemeClr val="accent1"/>
+            </a:solidFill>
+          </a:ln>
+        </p:spPr>
+        <p:txBody>
+          <a:bodyPr wrap="square" rtlCol="0">
+            <a:spAutoFit/>
+          </a:bodyPr>
+          <a:lstStyle/>
+          <a:p>
+            <a:pPr algn="ctr"/>
+            <a:r>
+              <a:rPr lang="en-GB" dirty="0"/>
+              <a:t>Single threaded </a:t>
+            </a:r>
+          </a:p>
+          <a:p>
+            <a:pPr algn="ctr"/>
+            <a:r>
+              <a:rPr lang="en-GB" dirty="0"/>
+              <a:t>component</a:t>
+            </a:r>
+          </a:p>
+        </p:txBody>
+      </p:sp>
+      <p:sp>
+        <p:nvSpPr>
+          <p:cNvPr id="18" name="TextBox 17">
+            <a:extLst>
+              <a:ext uri="{FF2B5EF4-FFF2-40B4-BE49-F238E27FC236}">
+                <a16:creationId xmlns:a16="http://schemas.microsoft.com/office/drawing/2014/main" id="{7E696B0D-DC41-43C5-B631-9FAC65913ACE}"/>
+              </a:ext>
+            </a:extLst>
+          </p:cNvPr>
+          <p:cNvSpPr txBox="1"/>
+          <p:nvPr/>
+        </p:nvSpPr>
+        <p:spPr>
+          <a:xfrm>
+            <a:off x="8068364" y="5440771"/>
+            <a:ext cx="1855831" cy="646331"/>
+          </a:xfrm>
+          <a:prstGeom prst="rect">
+            <a:avLst/>
+          </a:prstGeom>
+          <a:noFill/>
+          <a:ln>
+            <a:solidFill>
+              <a:schemeClr val="accent1"/>
+            </a:solidFill>
+          </a:ln>
+        </p:spPr>
+        <p:txBody>
+          <a:bodyPr wrap="square" rtlCol="0">
+            <a:spAutoFit/>
+          </a:bodyPr>
+          <a:lstStyle/>
+          <a:p>
+            <a:pPr algn="ctr"/>
+            <a:r>
+              <a:rPr lang="en-GB" dirty="0"/>
+              <a:t>Single threaded </a:t>
+            </a:r>
+          </a:p>
+          <a:p>
+            <a:pPr algn="ctr"/>
+            <a:r>
+              <a:rPr lang="en-GB" dirty="0"/>
+              <a:t>component</a:t>
+            </a:r>
+          </a:p>
+        </p:txBody>
+      </p:sp>
+      <p:sp>
+        <p:nvSpPr>
+          <p:cNvPr id="19" name="Arrow: Down 18">
+            <a:extLst>
+              <a:ext uri="{FF2B5EF4-FFF2-40B4-BE49-F238E27FC236}">
+                <a16:creationId xmlns:a16="http://schemas.microsoft.com/office/drawing/2014/main" id="{81C2FC1E-7005-4F7E-AA74-8D37A5670A9C}"/>
+              </a:ext>
+            </a:extLst>
+          </p:cNvPr>
+          <p:cNvSpPr/>
+          <p:nvPr/>
+        </p:nvSpPr>
+        <p:spPr>
+          <a:xfrm>
+            <a:off x="5726667" y="4867860"/>
+            <a:ext cx="369333" cy="369332"/>
+          </a:xfrm>
+          <a:prstGeom prst="downArrow">
+            <a:avLst/>
+          </a:prstGeom>
+        </p:spPr>
+        <p:style>
+          <a:lnRef idx="2">
+            <a:schemeClr val="accent1">
+              <a:shade val="50000"/>
+            </a:schemeClr>
+          </a:lnRef>
+          <a:fillRef idx="1">
+            <a:schemeClr val="accent1"/>
+          </a:fillRef>
+          <a:effectRef idx="0">
+            <a:schemeClr val="accent1"/>
+          </a:effectRef>
+          <a:fontRef idx="minor">
+            <a:schemeClr val="lt1"/>
+          </a:fontRef>
+        </p:style>
+        <p:txBody>
+          <a:bodyPr rtlCol="0" anchor="ctr"/>
+          <a:lstStyle/>
+          <a:p>
+            <a:pPr algn="ctr"/>
+            <a:endParaRPr lang="en-GB" dirty="0"/>
+          </a:p>
+        </p:txBody>
+      </p:sp>
+      <p:sp>
+        <p:nvSpPr>
+          <p:cNvPr id="20" name="Arrow: Down 19">
+            <a:extLst>
+              <a:ext uri="{FF2B5EF4-FFF2-40B4-BE49-F238E27FC236}">
+                <a16:creationId xmlns:a16="http://schemas.microsoft.com/office/drawing/2014/main" id="{CC30D080-574F-45C5-9B91-8C7FC6929103}"/>
+              </a:ext>
+            </a:extLst>
+          </p:cNvPr>
+          <p:cNvSpPr/>
+          <p:nvPr/>
+        </p:nvSpPr>
+        <p:spPr>
+          <a:xfrm>
+            <a:off x="8758672" y="4867860"/>
+            <a:ext cx="369333" cy="369332"/>
+          </a:xfrm>
+          <a:prstGeom prst="downArrow">
+            <a:avLst/>
+          </a:prstGeom>
+        </p:spPr>
+        <p:style>
+          <a:lnRef idx="2">
+            <a:schemeClr val="accent1">
+              <a:shade val="50000"/>
+            </a:schemeClr>
+          </a:lnRef>
+          <a:fillRef idx="1">
+            <a:schemeClr val="accent1"/>
+          </a:fillRef>
+          <a:effectRef idx="0">
+            <a:schemeClr val="accent1"/>
+          </a:effectRef>
+          <a:fontRef idx="minor">
+            <a:schemeClr val="lt1"/>
+          </a:fontRef>
+        </p:style>
+        <p:txBody>
+          <a:bodyPr rtlCol="0" anchor="ctr"/>
+          <a:lstStyle/>
+          <a:p>
+            <a:pPr algn="ctr"/>
+            <a:endParaRPr lang="en-GB" dirty="0"/>
+          </a:p>
+        </p:txBody>
+      </p:sp>
+    </p:spTree>
+    <p:extLst>
+      <p:ext uri="{BB962C8B-B14F-4D97-AF65-F5344CB8AC3E}">
+        <p14:creationId xmlns:p14="http://schemas.microsoft.com/office/powerpoint/2010/main" val="1950737009"/>
+      </p:ext>
+    </p:extLst>
+  </p:cSld>
+  <p:clrMapOvr>
+    <a:masterClrMapping/>
+  </p:clrMapOvr>
+</p:sld>
+</file>
+
 <file path=ppt/theme/theme1.xml><?xml version="1.0" encoding="utf-8"?>
 <a:theme xmlns:a="http://schemas.openxmlformats.org/drawingml/2006/main" name="Office Theme">
   <a:themeElements>

</xml_diff>